<commit_message>
parte 2 y 3 completadas
</commit_message>
<xml_diff>
--- a/DWECliente/P1_SaboridoTorresDaniel_DWEC.pptx
+++ b/DWECliente/P1_SaboridoTorresDaniel_DWEC.pptx
@@ -4719,10 +4719,92 @@
         </p:nvSpPr>
         <p:spPr/>
         <p:txBody>
-          <a:bodyPr/>
-          <a:lstStyle/>
-          <a:p>
-            <a:endParaRPr lang="es-ES" dirty="0"/>
+          <a:bodyPr anchor="ctr">
+            <a:normAutofit/>
+          </a:bodyPr>
+          <a:lstStyle/>
+          <a:p>
+            <a:pPr marL="0" indent="0" algn="just">
+              <a:buNone/>
+            </a:pPr>
+            <a:r>
+              <a:rPr lang="es-ES" sz="1400" dirty="0">
+                <a:solidFill>
+                  <a:schemeClr val="bg1"/>
+                </a:solidFill>
+              </a:rPr>
+              <a:t>	            Históricamente, JavaScript tenía problemas de compatibilidad entre navegadores, ya que diferentes navegadores como 	 	            Internet Explorer y Netscape implementaban scripts en formato de lenguaje diferentes y a pesar de que JavaScript y JScript 	            eran compatibles en cierta medida, a menudo surgían problemas de implementación conflictiva, lo que causaba 	 	            dificultades a los desarrolladores. </a:t>
+            </a:r>
+          </a:p>
+          <a:p>
+            <a:pPr marL="0" indent="0" algn="just">
+              <a:buNone/>
+            </a:pPr>
+            <a:r>
+              <a:rPr lang="es-ES" sz="1400" dirty="0">
+                <a:solidFill>
+                  <a:schemeClr val="bg1"/>
+                </a:solidFill>
+              </a:rPr>
+              <a:t>	            Afortunadamente, la compatibilidad entre navegadores ha mejorado significativamente con el tiempo, y los navegadores 	            modernos ahora admiten mejor las características estándar de JavaScript. Esto ha reducido la necesidad de utilizar código 	            específico para resolver problemas de compatibilidad, aunque aún existen navegadores antiguos que requieren consideración en este aspecto haciendo que en la actualidad los errores mas comunes sean pocos entre estos están:</a:t>
+            </a:r>
+          </a:p>
+          <a:p>
+            <a:pPr algn="just"/>
+            <a:r>
+              <a:rPr lang="es-ES" sz="1400" dirty="0">
+                <a:solidFill>
+                  <a:schemeClr val="bg1"/>
+                </a:solidFill>
+              </a:rPr>
+              <a:t>Cuando el código de detección del navegador es de mala calidad, el código de detección de características y el uso del prefijo del proveedor impiden que los navegadores ejecuten código que de otro modo podrían usar bien.</a:t>
+            </a:r>
+          </a:p>
+          <a:p>
+            <a:pPr algn="just"/>
+            <a:r>
+              <a:rPr lang="es-ES" sz="1400" dirty="0">
+                <a:solidFill>
+                  <a:schemeClr val="bg1"/>
+                </a:solidFill>
+              </a:rPr>
+              <a:t>Cuando los desarrolladores hacen uso de nuevas características de JavaScript en su código, como API web modernas, y encontrar que tales características no funcionan en navegadores más antiguos.</a:t>
+            </a:r>
+          </a:p>
+          <a:p>
+            <a:pPr marL="0" indent="0" algn="just">
+              <a:buNone/>
+            </a:pPr>
+            <a:r>
+              <a:rPr lang="es-ES" sz="1400" dirty="0">
+                <a:solidFill>
+                  <a:schemeClr val="bg1"/>
+                </a:solidFill>
+              </a:rPr>
+              <a:t>Algunas formas de solucionar estos errores son:</a:t>
+            </a:r>
+          </a:p>
+          <a:p>
+            <a:pPr algn="just"/>
+            <a:r>
+              <a:rPr lang="es-ES" sz="1400" dirty="0">
+                <a:solidFill>
+                  <a:schemeClr val="bg1"/>
+                </a:solidFill>
+              </a:rPr>
+              <a:t>Asegurarse de que las operaciones asincrónicas han devuelto un valor en específico antes de intentar utilizar dichos valores.</a:t>
+            </a:r>
+          </a:p>
+          <a:p>
+            <a:pPr algn="just"/>
+            <a:r>
+              <a:rPr lang="es-ES" sz="1400" dirty="0">
+                <a:solidFill>
+                  <a:schemeClr val="bg1"/>
+                </a:solidFill>
+              </a:rPr>
+              <a:t>Revisar el codigo cada vez que se modifique en caso de que surja algún imprevisto de compatibilidad, ya que pueden surgir un error de sintaxis (aquellos que son por escribir mal un comando) que son fáciles de solucionar o un error lógico siendo este mas complicado de solucionar ya que no suele ser indicado en la consola de comando y no se trata de directamente fallar el programa sino de darte un resultado erróneo.</a:t>
+            </a:r>
           </a:p>
         </p:txBody>
       </p:sp>
@@ -4790,6 +4872,45 @@
           </a:p>
         </p:txBody>
       </p:sp>
+      <p:pic>
+        <p:nvPicPr>
+          <p:cNvPr id="8" name="Imagen 7">
+            <a:extLst>
+              <a:ext uri="{FF2B5EF4-FFF2-40B4-BE49-F238E27FC236}">
+                <a16:creationId xmlns:a16="http://schemas.microsoft.com/office/drawing/2014/main" id="{61F90C33-BD3F-0528-0E44-53FA92234991}"/>
+              </a:ext>
+            </a:extLst>
+          </p:cNvPr>
+          <p:cNvPicPr>
+            <a:picLocks noChangeAspect="1"/>
+          </p:cNvPicPr>
+          <p:nvPr/>
+        </p:nvPicPr>
+        <p:blipFill>
+          <a:blip r:embed="rId2">
+            <a:extLst>
+              <a:ext uri="{28A0092B-C50C-407E-A947-70E740481C1C}">
+                <a14:useLocalDpi xmlns:a14="http://schemas.microsoft.com/office/drawing/2010/main" val="0"/>
+              </a:ext>
+              <a:ext uri="{837473B0-CC2E-450A-ABE3-18F120FF3D39}">
+                <a1611:picAttrSrcUrl xmlns:a1611="http://schemas.microsoft.com/office/drawing/2016/11/main" r:id="rId3"/>
+              </a:ext>
+            </a:extLst>
+          </a:blip>
+          <a:stretch>
+            <a:fillRect/>
+          </a:stretch>
+        </p:blipFill>
+        <p:spPr>
+          <a:xfrm>
+            <a:off x="780840" y="1870075"/>
+            <a:ext cx="1486918" cy="1486918"/>
+          </a:xfrm>
+          <a:prstGeom prst="rect">
+            <a:avLst/>
+          </a:prstGeom>
+        </p:spPr>
+      </p:pic>
       <p:sp>
         <p:nvSpPr>
           <p:cNvPr id="6" name="Marcador de número de diapositiva 5">
@@ -4918,7 +5039,7 @@
             <p:ph idx="1"/>
             <p:extLst>
               <p:ext uri="{D42A27DB-BD31-4B8C-83A1-F6EECF244321}">
-                <p14:modId xmlns:p14="http://schemas.microsoft.com/office/powerpoint/2010/main" val="1919305949"/>
+                <p14:modId xmlns:p14="http://schemas.microsoft.com/office/powerpoint/2010/main" val="2432967975"/>
               </p:ext>
             </p:extLst>
           </p:nvPr>
@@ -4968,6 +5089,7 @@
                       </a:r>
                     </a:p>
                     <a:p>
+                      <a:pPr algn="just"/>
                       <a:r>
                         <a:rPr lang="es-ES" sz="900" b="0" dirty="0"/>
                         <a:t>Puedes insertar el código directamente en cualquier parte del documento utilizando el elemento &lt;script&gt; de HTML. Un ejemplo de esta forma sería:</a:t>
@@ -5123,6 +5245,7 @@
                       </a:r>
                     </a:p>
                     <a:p>
+                      <a:pPr algn="just"/>
                       <a:r>
                         <a:rPr lang="es-ES" sz="900" b="0" dirty="0"/>
                         <a:t>También puedes agregar scripts en la sección &lt;head&gt; del documento HTML. Sin embargo, si deseas manipular el DOM desde allí, debes esperar a que el documento se cargue completamente utilizando el evento DOMContentLoaded. Un ejemplo de esta forma sería:</a:t>
@@ -5290,6 +5413,7 @@
                       </a:r>
                     </a:p>
                     <a:p>
+                      <a:pPr algn="just"/>
                       <a:r>
                         <a:rPr lang="es-ES" sz="900" b="0" dirty="0"/>
                         <a:t>A medida que tu código JavaScript crece, es conveniente escribirlo en archivos externos al documento HTML y referenciarlos mediante el atributo src del elemento &lt;script&gt;. Un ejemplo de esta forma sería:</a:t>
@@ -5593,31 +5717,6 @@
       </p:sp>
       <p:sp>
         <p:nvSpPr>
-          <p:cNvPr id="3" name="Marcador de contenido 2">
-            <a:extLst>
-              <a:ext uri="{FF2B5EF4-FFF2-40B4-BE49-F238E27FC236}">
-                <a16:creationId xmlns:a16="http://schemas.microsoft.com/office/drawing/2014/main" id="{F3CE1C01-9D43-CE1E-49DD-E0E4536D9009}"/>
-              </a:ext>
-            </a:extLst>
-          </p:cNvPr>
-          <p:cNvSpPr>
-            <a:spLocks noGrp="1"/>
-          </p:cNvSpPr>
-          <p:nvPr>
-            <p:ph idx="1"/>
-          </p:nvPr>
-        </p:nvSpPr>
-        <p:spPr/>
-        <p:txBody>
-          <a:bodyPr/>
-          <a:lstStyle/>
-          <a:p>
-            <a:endParaRPr lang="es-ES" dirty="0"/>
-          </a:p>
-        </p:txBody>
-      </p:sp>
-      <p:sp>
-        <p:nvSpPr>
           <p:cNvPr id="4" name="Marcador de fecha 3">
             <a:extLst>
               <a:ext uri="{FF2B5EF4-FFF2-40B4-BE49-F238E27FC236}">
@@ -5722,6 +5821,405 @@
           </a:p>
         </p:txBody>
       </p:sp>
+      <p:sp>
+        <p:nvSpPr>
+          <p:cNvPr id="7" name="CuadroTexto 6">
+            <a:extLst>
+              <a:ext uri="{FF2B5EF4-FFF2-40B4-BE49-F238E27FC236}">
+                <a16:creationId xmlns:a16="http://schemas.microsoft.com/office/drawing/2014/main" id="{81317642-7127-DEE0-8C3E-2813D790A746}"/>
+              </a:ext>
+            </a:extLst>
+          </p:cNvPr>
+          <p:cNvSpPr txBox="1"/>
+          <p:nvPr/>
+        </p:nvSpPr>
+        <p:spPr>
+          <a:xfrm>
+            <a:off x="1785664" y="1561287"/>
+            <a:ext cx="9568129" cy="1107996"/>
+          </a:xfrm>
+          <a:prstGeom prst="rect">
+            <a:avLst/>
+          </a:prstGeom>
+          <a:noFill/>
+        </p:spPr>
+        <p:txBody>
+          <a:bodyPr wrap="square" rtlCol="0">
+            <a:spAutoFit/>
+          </a:bodyPr>
+          <a:lstStyle/>
+          <a:p>
+            <a:pPr algn="just"/>
+            <a:r>
+              <a:rPr lang="es-ES" b="1" dirty="0">
+                <a:solidFill>
+                  <a:schemeClr val="bg1"/>
+                </a:solidFill>
+              </a:rPr>
+              <a:t>JavaScript:</a:t>
+            </a:r>
+            <a:r>
+              <a:rPr lang="es-ES" dirty="0">
+                <a:solidFill>
+                  <a:schemeClr val="bg1"/>
+                </a:solidFill>
+              </a:rPr>
+              <a:t> </a:t>
+            </a:r>
+            <a:r>
+              <a:rPr lang="es-ES" sz="1600" dirty="0">
+                <a:solidFill>
+                  <a:schemeClr val="bg1"/>
+                </a:solidFill>
+              </a:rPr>
+              <a:t>Siendo un lenguaje de programación interpretado y orientado a objetos, es de tipado dinámico, lo que significa que los tipos de datos son asignados en tiempo de ejecución. JavaScript es la base de muchos frameworks y librerías populares en el desarrollo web, como React, Angular y Vue.js y es soportado por todos los navegadores web modernos.</a:t>
+            </a:r>
+            <a:endParaRPr lang="es-ES" b="1" dirty="0">
+              <a:solidFill>
+                <a:schemeClr val="bg1"/>
+              </a:solidFill>
+            </a:endParaRPr>
+          </a:p>
+        </p:txBody>
+      </p:sp>
+      <p:sp>
+        <p:nvSpPr>
+          <p:cNvPr id="8" name="CuadroTexto 7">
+            <a:extLst>
+              <a:ext uri="{FF2B5EF4-FFF2-40B4-BE49-F238E27FC236}">
+                <a16:creationId xmlns:a16="http://schemas.microsoft.com/office/drawing/2014/main" id="{68978D88-16A3-5722-D608-27D7F3DDF95B}"/>
+              </a:ext>
+            </a:extLst>
+          </p:cNvPr>
+          <p:cNvSpPr txBox="1"/>
+          <p:nvPr/>
+        </p:nvSpPr>
+        <p:spPr>
+          <a:xfrm>
+            <a:off x="1785664" y="2669283"/>
+            <a:ext cx="9568129" cy="1107996"/>
+          </a:xfrm>
+          <a:prstGeom prst="rect">
+            <a:avLst/>
+          </a:prstGeom>
+          <a:noFill/>
+        </p:spPr>
+        <p:txBody>
+          <a:bodyPr wrap="square" rtlCol="0">
+            <a:spAutoFit/>
+          </a:bodyPr>
+          <a:lstStyle/>
+          <a:p>
+            <a:pPr algn="just"/>
+            <a:r>
+              <a:rPr lang="es-ES" b="1" dirty="0">
+                <a:solidFill>
+                  <a:schemeClr val="bg1"/>
+                </a:solidFill>
+              </a:rPr>
+              <a:t>TypeScript:</a:t>
+            </a:r>
+            <a:r>
+              <a:rPr lang="es-ES" dirty="0">
+                <a:solidFill>
+                  <a:schemeClr val="bg1"/>
+                </a:solidFill>
+              </a:rPr>
+              <a:t> E</a:t>
+            </a:r>
+            <a:r>
+              <a:rPr lang="es-ES" sz="1600" dirty="0">
+                <a:solidFill>
+                  <a:schemeClr val="bg1"/>
+                </a:solidFill>
+              </a:rPr>
+              <a:t>s una extensión de JavaScript que agrega tipos estáticos al lenguaje, este lenguaje puede utilizarse con librerías y frameworks JavaScript existentes, y es especialmente popular en proyectos que utilizan Angular y también ayuda a detectar errores en tiempo de desarrollo y proporciona un código más limpio y autodocumentado.</a:t>
+            </a:r>
+            <a:endParaRPr lang="es-ES" b="1" dirty="0">
+              <a:solidFill>
+                <a:schemeClr val="bg1"/>
+              </a:solidFill>
+            </a:endParaRPr>
+          </a:p>
+        </p:txBody>
+      </p:sp>
+      <p:sp>
+        <p:nvSpPr>
+          <p:cNvPr id="9" name="CuadroTexto 8">
+            <a:extLst>
+              <a:ext uri="{FF2B5EF4-FFF2-40B4-BE49-F238E27FC236}">
+                <a16:creationId xmlns:a16="http://schemas.microsoft.com/office/drawing/2014/main" id="{EFEF2553-16F5-3589-4EFC-BD670B38D505}"/>
+              </a:ext>
+            </a:extLst>
+          </p:cNvPr>
+          <p:cNvSpPr txBox="1"/>
+          <p:nvPr/>
+        </p:nvSpPr>
+        <p:spPr>
+          <a:xfrm>
+            <a:off x="2191822" y="3805931"/>
+            <a:ext cx="9187846" cy="1107996"/>
+          </a:xfrm>
+          <a:prstGeom prst="rect">
+            <a:avLst/>
+          </a:prstGeom>
+          <a:noFill/>
+        </p:spPr>
+        <p:txBody>
+          <a:bodyPr wrap="square" rtlCol="0">
+            <a:spAutoFit/>
+          </a:bodyPr>
+          <a:lstStyle/>
+          <a:p>
+            <a:pPr algn="just"/>
+            <a:r>
+              <a:rPr lang="en-US" b="1" dirty="0">
+                <a:solidFill>
+                  <a:schemeClr val="bg1"/>
+                </a:solidFill>
+              </a:rPr>
+              <a:t>SASS</a:t>
+            </a:r>
+            <a:r>
+              <a:rPr lang="es-ES" b="1" dirty="0">
+                <a:solidFill>
+                  <a:schemeClr val="bg1"/>
+                </a:solidFill>
+              </a:rPr>
+              <a:t>:</a:t>
+            </a:r>
+            <a:r>
+              <a:rPr lang="es-ES" dirty="0">
+                <a:solidFill>
+                  <a:schemeClr val="bg1"/>
+                </a:solidFill>
+              </a:rPr>
+              <a:t> </a:t>
+            </a:r>
+            <a:r>
+              <a:rPr lang="es-ES" sz="1600" dirty="0">
+                <a:solidFill>
+                  <a:schemeClr val="bg1"/>
+                </a:solidFill>
+              </a:rPr>
+              <a:t>Es un preprocesador de CSS, se suele utilizar para mejorar la legibilidad y mantenibilidad del código, permitiendo variables, anidamiento, mixins y más, se caracteriza por tener que ser compilado a CSS antes de ser interpretado por el navegador y facilita la reutilización de código y la organización de estilos en proyectos grandes.</a:t>
+            </a:r>
+            <a:endParaRPr lang="es-ES" b="1" dirty="0">
+              <a:solidFill>
+                <a:schemeClr val="bg1"/>
+              </a:solidFill>
+            </a:endParaRPr>
+          </a:p>
+        </p:txBody>
+      </p:sp>
+      <p:sp>
+        <p:nvSpPr>
+          <p:cNvPr id="11" name="CuadroTexto 10">
+            <a:extLst>
+              <a:ext uri="{FF2B5EF4-FFF2-40B4-BE49-F238E27FC236}">
+                <a16:creationId xmlns:a16="http://schemas.microsoft.com/office/drawing/2014/main" id="{82B4BB08-8F15-5C31-54F8-BF12480ACD76}"/>
+              </a:ext>
+            </a:extLst>
+          </p:cNvPr>
+          <p:cNvSpPr txBox="1"/>
+          <p:nvPr/>
+        </p:nvSpPr>
+        <p:spPr>
+          <a:xfrm>
+            <a:off x="1785664" y="4978251"/>
+            <a:ext cx="8714113" cy="1107996"/>
+          </a:xfrm>
+          <a:prstGeom prst="rect">
+            <a:avLst/>
+          </a:prstGeom>
+          <a:noFill/>
+        </p:spPr>
+        <p:txBody>
+          <a:bodyPr wrap="square" rtlCol="0">
+            <a:spAutoFit/>
+          </a:bodyPr>
+          <a:lstStyle/>
+          <a:p>
+            <a:pPr algn="just"/>
+            <a:r>
+              <a:rPr lang="es-ES" b="1" dirty="0">
+                <a:solidFill>
+                  <a:schemeClr val="bg1"/>
+                </a:solidFill>
+              </a:rPr>
+              <a:t>React:</a:t>
+            </a:r>
+            <a:r>
+              <a:rPr lang="es-ES" dirty="0">
+                <a:solidFill>
+                  <a:schemeClr val="bg1"/>
+                </a:solidFill>
+              </a:rPr>
+              <a:t> </a:t>
+            </a:r>
+            <a:r>
+              <a:rPr lang="es-ES" sz="1600" dirty="0">
+                <a:solidFill>
+                  <a:schemeClr val="bg1"/>
+                </a:solidFill>
+              </a:rPr>
+              <a:t>Utiliza principalmente JavaScript para desarrollar interfaces de usuario, se basa en la creación de componentes reutilizables que gestionan su propio estado y renderizado, utiliza un Virtual DOM para optimizar las actualizaciones de la interfaz de usuario y mejorar el rendimiento y al ser una librería de vista para construir interfaces de usuario interactivas.</a:t>
+            </a:r>
+            <a:endParaRPr lang="es-ES" b="1" dirty="0">
+              <a:solidFill>
+                <a:schemeClr val="bg1"/>
+              </a:solidFill>
+            </a:endParaRPr>
+          </a:p>
+        </p:txBody>
+      </p:sp>
+      <p:pic>
+        <p:nvPicPr>
+          <p:cNvPr id="15" name="Imagen 14">
+            <a:extLst>
+              <a:ext uri="{FF2B5EF4-FFF2-40B4-BE49-F238E27FC236}">
+                <a16:creationId xmlns:a16="http://schemas.microsoft.com/office/drawing/2014/main" id="{57773088-1CA6-30B5-556E-28C77187436C}"/>
+              </a:ext>
+            </a:extLst>
+          </p:cNvPr>
+          <p:cNvPicPr>
+            <a:picLocks noChangeAspect="1"/>
+          </p:cNvPicPr>
+          <p:nvPr/>
+        </p:nvPicPr>
+        <p:blipFill>
+          <a:blip r:embed="rId2"/>
+          <a:stretch>
+            <a:fillRect/>
+          </a:stretch>
+        </p:blipFill>
+        <p:spPr>
+          <a:xfrm>
+            <a:off x="838201" y="1651165"/>
+            <a:ext cx="947468" cy="947468"/>
+          </a:xfrm>
+          <a:prstGeom prst="rect">
+            <a:avLst/>
+          </a:prstGeom>
+        </p:spPr>
+      </p:pic>
+      <p:pic>
+        <p:nvPicPr>
+          <p:cNvPr id="17" name="Imagen 16">
+            <a:extLst>
+              <a:ext uri="{FF2B5EF4-FFF2-40B4-BE49-F238E27FC236}">
+                <a16:creationId xmlns:a16="http://schemas.microsoft.com/office/drawing/2014/main" id="{2AA5B9F6-85F2-16AA-E2DA-1D7CD35735A4}"/>
+              </a:ext>
+            </a:extLst>
+          </p:cNvPr>
+          <p:cNvPicPr>
+            <a:picLocks noChangeAspect="1"/>
+          </p:cNvPicPr>
+          <p:nvPr/>
+        </p:nvPicPr>
+        <p:blipFill>
+          <a:blip r:embed="rId3">
+            <a:extLst>
+              <a:ext uri="{28A0092B-C50C-407E-A947-70E740481C1C}">
+                <a14:useLocalDpi xmlns:a14="http://schemas.microsoft.com/office/drawing/2010/main" val="0"/>
+              </a:ext>
+              <a:ext uri="{837473B0-CC2E-450A-ABE3-18F120FF3D39}">
+                <a1611:picAttrSrcUrl xmlns:a1611="http://schemas.microsoft.com/office/drawing/2016/11/main" r:id="rId4"/>
+              </a:ext>
+            </a:extLst>
+          </a:blip>
+          <a:stretch>
+            <a:fillRect/>
+          </a:stretch>
+        </p:blipFill>
+        <p:spPr>
+          <a:xfrm>
+            <a:off x="838200" y="2722065"/>
+            <a:ext cx="947468" cy="947468"/>
+          </a:xfrm>
+          <a:prstGeom prst="rect">
+            <a:avLst/>
+          </a:prstGeom>
+        </p:spPr>
+      </p:pic>
+      <p:pic>
+        <p:nvPicPr>
+          <p:cNvPr id="20" name="Imagen 19">
+            <a:extLst>
+              <a:ext uri="{FF2B5EF4-FFF2-40B4-BE49-F238E27FC236}">
+                <a16:creationId xmlns:a16="http://schemas.microsoft.com/office/drawing/2014/main" id="{48F13F78-FA46-8307-CD23-2FDDEF1D5706}"/>
+              </a:ext>
+            </a:extLst>
+          </p:cNvPr>
+          <p:cNvPicPr>
+            <a:picLocks noChangeAspect="1"/>
+          </p:cNvPicPr>
+          <p:nvPr/>
+        </p:nvPicPr>
+        <p:blipFill>
+          <a:blip r:embed="rId5">
+            <a:extLst>
+              <a:ext uri="{28A0092B-C50C-407E-A947-70E740481C1C}">
+                <a14:useLocalDpi xmlns:a14="http://schemas.microsoft.com/office/drawing/2010/main" val="0"/>
+              </a:ext>
+              <a:ext uri="{837473B0-CC2E-450A-ABE3-18F120FF3D39}">
+                <a1611:picAttrSrcUrl xmlns:a1611="http://schemas.microsoft.com/office/drawing/2016/11/main" r:id="rId6"/>
+              </a:ext>
+            </a:extLst>
+          </a:blip>
+          <a:stretch>
+            <a:fillRect/>
+          </a:stretch>
+        </p:blipFill>
+        <p:spPr>
+          <a:xfrm>
+            <a:off x="296888" y="3870255"/>
+            <a:ext cx="1894936" cy="947468"/>
+          </a:xfrm>
+          <a:prstGeom prst="rect">
+            <a:avLst/>
+          </a:prstGeom>
+        </p:spPr>
+      </p:pic>
+      <p:pic>
+        <p:nvPicPr>
+          <p:cNvPr id="23" name="Imagen 22">
+            <a:extLst>
+              <a:ext uri="{FF2B5EF4-FFF2-40B4-BE49-F238E27FC236}">
+                <a16:creationId xmlns:a16="http://schemas.microsoft.com/office/drawing/2014/main" id="{37CF270E-B920-D447-ABE8-777B255AC285}"/>
+              </a:ext>
+            </a:extLst>
+          </p:cNvPr>
+          <p:cNvPicPr>
+            <a:picLocks noChangeAspect="1"/>
+          </p:cNvPicPr>
+          <p:nvPr/>
+        </p:nvPicPr>
+        <p:blipFill>
+          <a:blip r:embed="rId7">
+            <a:extLst>
+              <a:ext uri="{28A0092B-C50C-407E-A947-70E740481C1C}">
+                <a14:useLocalDpi xmlns:a14="http://schemas.microsoft.com/office/drawing/2010/main" val="0"/>
+              </a:ext>
+              <a:ext uri="{837473B0-CC2E-450A-ABE3-18F120FF3D39}">
+                <a1611:picAttrSrcUrl xmlns:a1611="http://schemas.microsoft.com/office/drawing/2016/11/main" r:id="rId8"/>
+              </a:ext>
+            </a:extLst>
+          </a:blip>
+          <a:stretch>
+            <a:fillRect/>
+          </a:stretch>
+        </p:blipFill>
+        <p:spPr>
+          <a:xfrm>
+            <a:off x="838200" y="5018445"/>
+            <a:ext cx="947469" cy="947469"/>
+          </a:xfrm>
+          <a:prstGeom prst="rect">
+            <a:avLst/>
+          </a:prstGeom>
+        </p:spPr>
+      </p:pic>
     </p:spTree>
     <p:extLst>
       <p:ext uri="{BB962C8B-B14F-4D97-AF65-F5344CB8AC3E}">
@@ -6177,7 +6675,7 @@
             <p:ph idx="1"/>
             <p:extLst>
               <p:ext uri="{D42A27DB-BD31-4B8C-83A1-F6EECF244321}">
-                <p14:modId xmlns:p14="http://schemas.microsoft.com/office/powerpoint/2010/main" val="516259590"/>
+                <p14:modId xmlns:p14="http://schemas.microsoft.com/office/powerpoint/2010/main" val="1916717381"/>
               </p:ext>
             </p:extLst>
           </p:nvPr>
@@ -6323,7 +6821,7 @@
                     <a:bodyPr/>
                     <a:lstStyle/>
                     <a:p>
-                      <a:pPr algn="l"/>
+                      <a:pPr algn="just"/>
                       <a:r>
                         <a:rPr lang="es-ES" dirty="0"/>
                         <a:t>Son principalmente </a:t>
@@ -6382,7 +6880,7 @@
                     <a:bodyPr/>
                     <a:lstStyle/>
                     <a:p>
-                      <a:pPr algn="l"/>
+                      <a:pPr algn="just"/>
                       <a:r>
                         <a:rPr lang="es-ES" dirty="0"/>
                         <a:t>Se tienen que </a:t>
@@ -6448,7 +6946,7 @@
                     <a:bodyPr/>
                     <a:lstStyle/>
                     <a:p>
-                      <a:pPr marL="0" marR="0" lvl="0" indent="0" algn="l" defTabSz="914400" rtl="0" eaLnBrk="1" fontAlgn="auto" latinLnBrk="0" hangingPunct="1">
+                      <a:pPr marL="0" marR="0" lvl="0" indent="0" algn="just" defTabSz="914400" rtl="0" eaLnBrk="1" fontAlgn="auto" latinLnBrk="0" hangingPunct="1">
                         <a:lnSpc>
                           <a:spcPct val="100000"/>
                         </a:lnSpc>
@@ -6536,7 +7034,7 @@
                     <a:bodyPr/>
                     <a:lstStyle/>
                     <a:p>
-                      <a:pPr algn="l"/>
+                      <a:pPr algn="just"/>
                       <a:r>
                         <a:rPr lang="es-ES" dirty="0"/>
                         <a:t>Son independientes de la plataforma y pueden ejecutarse en </a:t>
@@ -6598,7 +7096,7 @@
                     <a:bodyPr/>
                     <a:lstStyle/>
                     <a:p>
-                      <a:pPr algn="l"/>
+                      <a:pPr algn="just"/>
                       <a:r>
                         <a:rPr lang="es-ES" dirty="0"/>
                         <a:t>El código lo interpreta línea por línea y disponen de una menor optimización, dando como resultado una mayor </a:t>
@@ -6657,7 +7155,7 @@
                     <a:bodyPr/>
                     <a:lstStyle/>
                     <a:p>
-                      <a:pPr algn="l"/>
+                      <a:pPr algn="just"/>
                       <a:r>
                         <a:rPr lang="es-ES" dirty="0"/>
                         <a:t>Compilan el código dando mayor optimización seguido de una mayor </a:t>
@@ -6723,7 +7221,7 @@
                     <a:bodyPr/>
                     <a:lstStyle/>
                     <a:p>
-                      <a:pPr algn="l"/>
+                      <a:pPr algn="just"/>
                       <a:r>
                         <a:rPr lang="es-ES" dirty="0"/>
                         <a:t>Son más adecuados para tareas de </a:t>
@@ -6782,7 +7280,7 @@
                     <a:bodyPr/>
                     <a:lstStyle/>
                     <a:p>
-                      <a:pPr algn="l"/>
+                      <a:pPr algn="just"/>
                       <a:r>
                         <a:rPr lang="es-ES" dirty="0"/>
                         <a:t>Requiere de introducir </a:t>
@@ -6848,7 +7346,7 @@
                     <a:bodyPr/>
                     <a:lstStyle/>
                     <a:p>
-                      <a:pPr algn="l"/>
+                      <a:pPr algn="just"/>
                       <a:r>
                         <a:rPr lang="es-ES" dirty="0"/>
                         <a:t>Donde se suelen utilizar son en aplicaciones web y móviles por el hecho de depender de </a:t>
@@ -6903,7 +7401,7 @@
                     <a:bodyPr/>
                     <a:lstStyle/>
                     <a:p>
-                      <a:pPr algn="l"/>
+                      <a:pPr algn="just"/>
                       <a:r>
                         <a:rPr lang="es-ES" dirty="0"/>
                         <a:t>Son utilizados para crear </a:t>
@@ -7356,7 +7854,7 @@
             <p:ph idx="1"/>
             <p:extLst>
               <p:ext uri="{D42A27DB-BD31-4B8C-83A1-F6EECF244321}">
-                <p14:modId xmlns:p14="http://schemas.microsoft.com/office/powerpoint/2010/main" val="52619937"/>
+                <p14:modId xmlns:p14="http://schemas.microsoft.com/office/powerpoint/2010/main" val="1988506907"/>
               </p:ext>
             </p:extLst>
           </p:nvPr>
@@ -7400,6 +7898,7 @@
                     <a:bodyPr/>
                     <a:lstStyle/>
                     <a:p>
+                      <a:pPr algn="l"/>
                       <a:r>
                         <a:rPr lang="es-ES" sz="1000" b="1" dirty="0">
                           <a:solidFill>
@@ -7410,6 +7909,7 @@
                       </a:r>
                     </a:p>
                     <a:p>
+                      <a:pPr algn="l"/>
                       <a:r>
                         <a:rPr lang="es-ES" sz="900" b="0" dirty="0">
                           <a:solidFill>
@@ -7420,6 +7920,7 @@
                       </a:r>
                     </a:p>
                     <a:p>
+                      <a:pPr algn="l"/>
                       <a:r>
                         <a:rPr lang="es-ES" sz="900" b="0" dirty="0">
                           <a:solidFill>
@@ -7430,6 +7931,7 @@
                       </a:r>
                     </a:p>
                     <a:p>
+                      <a:pPr algn="l"/>
                       <a:r>
                         <a:rPr lang="es-ES" sz="900" b="0" dirty="0">
                           <a:solidFill>
@@ -7440,6 +7942,7 @@
                       </a:r>
                     </a:p>
                     <a:p>
+                      <a:pPr algn="l"/>
                       <a:r>
                         <a:rPr lang="es-ES" sz="900" b="0" dirty="0">
                           <a:solidFill>
@@ -7450,6 +7953,7 @@
                       </a:r>
                     </a:p>
                     <a:p>
+                      <a:pPr algn="l"/>
                       <a:r>
                         <a:rPr lang="es-ES" sz="900" b="0" dirty="0">
                           <a:solidFill>
@@ -7460,6 +7964,7 @@
                       </a:r>
                     </a:p>
                     <a:p>
+                      <a:pPr algn="l"/>
                       <a:r>
                         <a:rPr lang="es-ES" sz="900" b="0" dirty="0">
                           <a:solidFill>
@@ -7470,6 +7975,7 @@
                       </a:r>
                     </a:p>
                     <a:p>
+                      <a:pPr algn="l"/>
                       <a:r>
                         <a:rPr lang="es-ES" sz="900" b="0" dirty="0">
                           <a:solidFill>
@@ -7480,6 +7986,7 @@
                       </a:r>
                     </a:p>
                     <a:p>
+                      <a:pPr algn="l"/>
                       <a:r>
                         <a:rPr lang="es-ES" sz="900" b="0" dirty="0">
                           <a:solidFill>
@@ -7490,6 +7997,7 @@
                       </a:r>
                     </a:p>
                     <a:p>
+                      <a:pPr algn="l"/>
                       <a:r>
                         <a:rPr lang="es-ES" sz="900" b="0" dirty="0">
                           <a:solidFill>
@@ -7500,6 +8008,7 @@
                       </a:r>
                     </a:p>
                     <a:p>
+                      <a:pPr algn="l"/>
                       <a:r>
                         <a:rPr lang="es-ES" sz="900" b="0" dirty="0">
                           <a:solidFill>
@@ -7510,6 +8019,7 @@
                       </a:r>
                     </a:p>
                     <a:p>
+                      <a:pPr algn="l"/>
                       <a:r>
                         <a:rPr lang="es-ES" sz="900" b="0" dirty="0">
                           <a:solidFill>
@@ -7520,6 +8030,7 @@
                       </a:r>
                     </a:p>
                     <a:p>
+                      <a:pPr algn="l"/>
                       <a:r>
                         <a:rPr lang="es-ES" sz="900" b="0" dirty="0">
                           <a:solidFill>
@@ -7530,6 +8041,7 @@
                       </a:r>
                     </a:p>
                     <a:p>
+                      <a:pPr algn="l"/>
                       <a:r>
                         <a:rPr lang="es-ES" sz="900" b="0" dirty="0">
                           <a:solidFill>
@@ -7540,6 +8052,7 @@
                       </a:r>
                     </a:p>
                     <a:p>
+                      <a:pPr algn="l"/>
                       <a:r>
                         <a:rPr lang="es-ES" sz="900" b="0" dirty="0">
                           <a:solidFill>
@@ -7550,6 +8063,7 @@
                       </a:r>
                     </a:p>
                     <a:p>
+                      <a:pPr algn="l"/>
                       <a:r>
                         <a:rPr lang="es-ES" sz="900" b="0" dirty="0">
                           <a:solidFill>
@@ -7560,6 +8074,7 @@
                       </a:r>
                     </a:p>
                     <a:p>
+                      <a:pPr algn="l"/>
                       <a:r>
                         <a:rPr lang="es-ES" sz="900" b="0" dirty="0">
                           <a:solidFill>
@@ -7570,16 +8085,18 @@
                       </a:r>
                     </a:p>
                     <a:p>
+                      <a:pPr algn="l"/>
                       <a:r>
                         <a:rPr lang="es-ES" sz="900" b="0" dirty="0">
                           <a:solidFill>
                             <a:schemeClr val="bg1"/>
                           </a:solidFill>
                         </a:rPr>
-                        <a:t>	        &lt;input type="text" id="num"&gt;</a:t>
-                      </a:r>
-                    </a:p>
-                    <a:p>
+                        <a:t>            &lt;input type="text" id="num"&gt;</a:t>
+                      </a:r>
+                    </a:p>
+                    <a:p>
+                      <a:pPr algn="l"/>
                       <a:r>
                         <a:rPr lang="es-ES" sz="900" b="0" dirty="0">
                           <a:solidFill>
@@ -7590,6 +8107,7 @@
                       </a:r>
                     </a:p>
                     <a:p>
+                      <a:pPr algn="l"/>
                       <a:r>
                         <a:rPr lang="es-ES" sz="900" b="0" dirty="0">
                           <a:solidFill>
@@ -7600,16 +8118,18 @@
                       </a:r>
                     </a:p>
                     <a:p>
+                      <a:pPr algn="l"/>
                       <a:r>
                         <a:rPr lang="es-ES" sz="900" b="0" dirty="0">
                           <a:solidFill>
                             <a:schemeClr val="bg1"/>
                           </a:solidFill>
                         </a:rPr>
-                        <a:t>            &lt;div class="boton" id="BorrarR" onclick="reseteo();"&gt;Reseteo&lt;/div&gt;</a:t>
-                      </a:r>
-                    </a:p>
-                    <a:p>
+                        <a:t>            &lt;div class="boton" id="BorrarR“ onclick="reseteo();“&gt;Reseteo&lt;/div&gt;</a:t>
+                      </a:r>
+                    </a:p>
+                    <a:p>
+                      <a:pPr algn="l"/>
                       <a:r>
                         <a:rPr lang="es-ES" sz="900" b="0" dirty="0">
                           <a:solidFill>
@@ -7620,6 +8140,7 @@
                       </a:r>
                     </a:p>
                     <a:p>
+                      <a:pPr algn="l"/>
                       <a:r>
                         <a:rPr lang="es-ES" sz="900" b="0" dirty="0">
                           <a:solidFill>
@@ -7630,6 +8151,7 @@
                       </a:r>
                     </a:p>
                     <a:p>
+                      <a:pPr algn="l"/>
                       <a:r>
                         <a:rPr lang="es-ES" sz="900" b="0" dirty="0">
                           <a:solidFill>
@@ -7640,6 +8162,7 @@
                       </a:r>
                     </a:p>
                     <a:p>
+                      <a:pPr algn="l"/>
                       <a:r>
                         <a:rPr lang="es-ES" sz="900" b="0" dirty="0">
                           <a:solidFill>
@@ -7650,6 +8173,7 @@
                       </a:r>
                     </a:p>
                     <a:p>
+                      <a:pPr algn="l"/>
                       <a:r>
                         <a:rPr lang="es-ES" sz="900" b="0" dirty="0">
                           <a:solidFill>
@@ -7660,6 +8184,7 @@
                       </a:r>
                     </a:p>
                     <a:p>
+                      <a:pPr algn="l"/>
                       <a:r>
                         <a:rPr lang="es-ES" sz="900" b="0" dirty="0">
                           <a:solidFill>
@@ -7670,6 +8195,7 @@
                       </a:r>
                     </a:p>
                     <a:p>
+                      <a:pPr algn="l"/>
                       <a:r>
                         <a:rPr lang="es-ES" sz="900" b="0" dirty="0">
                           <a:solidFill>
@@ -7680,6 +8206,7 @@
                       </a:r>
                     </a:p>
                     <a:p>
+                      <a:pPr algn="l"/>
                       <a:r>
                         <a:rPr lang="es-ES" sz="900" b="0" dirty="0">
                           <a:solidFill>
@@ -7742,180 +8269,222 @@
                     <a:bodyPr/>
                     <a:lstStyle/>
                     <a:p>
+                      <a:pPr algn="l"/>
                       <a:r>
                         <a:rPr lang="es-ES" sz="1000" b="1" dirty="0"/>
                         <a:t>- CSS:</a:t>
                       </a:r>
                     </a:p>
                     <a:p>
+                      <a:pPr algn="l"/>
                       <a:r>
                         <a:rPr lang="es-ES" sz="900" b="0" dirty="0"/>
                         <a:t>body {</a:t>
                       </a:r>
                     </a:p>
                     <a:p>
+                      <a:pPr algn="l"/>
                       <a:r>
                         <a:rPr lang="es-ES" sz="900" b="0" dirty="0"/>
                         <a:t>    color: rgb(0, 0, 0);</a:t>
                       </a:r>
                     </a:p>
                     <a:p>
+                      <a:pPr algn="l"/>
                       <a:r>
                         <a:rPr lang="es-ES" sz="900" b="0" dirty="0"/>
                         <a:t>}</a:t>
                       </a:r>
                     </a:p>
                     <a:p>
+                      <a:pPr algn="l"/>
+                      <a:endParaRPr lang="es-ES" sz="900" b="0" dirty="0"/>
+                    </a:p>
+                    <a:p>
+                      <a:pPr algn="l"/>
                       <a:r>
                         <a:rPr lang="es-ES" sz="900" b="0" dirty="0"/>
                         <a:t>.tabla{</a:t>
                       </a:r>
                     </a:p>
                     <a:p>
+                      <a:pPr algn="l"/>
                       <a:r>
                         <a:rPr lang="es-ES" sz="900" b="0" dirty="0"/>
                         <a:t>    display: grid;</a:t>
                       </a:r>
                     </a:p>
                     <a:p>
+                      <a:pPr algn="l"/>
                       <a:r>
                         <a:rPr lang="es-ES" sz="900" b="0" dirty="0"/>
                         <a:t>    grid-template-columns: auto auto auto auto auto;</a:t>
                       </a:r>
                     </a:p>
                     <a:p>
+                      <a:pPr algn="l"/>
                       <a:r>
                         <a:rPr lang="es-ES" sz="900" b="0" dirty="0"/>
                         <a:t>    margin: auto;</a:t>
                       </a:r>
                     </a:p>
                     <a:p>
+                      <a:pPr algn="l"/>
                       <a:r>
                         <a:rPr lang="es-ES" sz="900" b="0" dirty="0"/>
                         <a:t>    margin-top: 5%;</a:t>
                       </a:r>
                     </a:p>
                     <a:p>
+                      <a:pPr algn="l"/>
                       <a:r>
                         <a:rPr lang="es-ES" sz="900" b="0" dirty="0"/>
                         <a:t>    width: 35%;</a:t>
                       </a:r>
                     </a:p>
                     <a:p>
+                      <a:pPr algn="l"/>
                       <a:r>
                         <a:rPr lang="es-ES" sz="900" b="0" dirty="0"/>
                         <a:t>    border-collapse: collapse;</a:t>
                       </a:r>
                     </a:p>
                     <a:p>
+                      <a:pPr algn="l"/>
                       <a:r>
                         <a:rPr lang="es-ES" sz="900" b="0" dirty="0"/>
                         <a:t>    padding: 5px;</a:t>
                       </a:r>
                     </a:p>
                     <a:p>
+                      <a:pPr algn="l"/>
                       <a:r>
                         <a:rPr lang="es-ES" sz="900" b="0" dirty="0"/>
                         <a:t>    font-size: 25px;</a:t>
                       </a:r>
                     </a:p>
                     <a:p>
+                      <a:pPr algn="l"/>
                       <a:r>
                         <a:rPr lang="es-ES" sz="900" b="0" dirty="0"/>
                         <a:t>    text-align: center;</a:t>
                       </a:r>
                     </a:p>
                     <a:p>
+                      <a:pPr algn="l"/>
                       <a:r>
                         <a:rPr lang="es-ES" sz="900" b="0" dirty="0"/>
                         <a:t>}</a:t>
                       </a:r>
                     </a:p>
                     <a:p>
+                      <a:pPr algn="l"/>
+                      <a:endParaRPr lang="es-ES" sz="900" b="0" dirty="0"/>
+                    </a:p>
+                    <a:p>
+                      <a:pPr algn="l"/>
                       <a:r>
                         <a:rPr lang="es-ES" sz="900" b="0" dirty="0"/>
                         <a:t>.botones, .seleccion {</a:t>
                       </a:r>
                     </a:p>
                     <a:p>
+                      <a:pPr algn="l"/>
                       <a:r>
                         <a:rPr lang="es-ES" sz="900" b="0" dirty="0"/>
                         <a:t>    margin: auto;</a:t>
                       </a:r>
                     </a:p>
                     <a:p>
+                      <a:pPr algn="l"/>
                       <a:r>
                         <a:rPr lang="es-ES" sz="900" b="0" dirty="0"/>
                         <a:t>    width: 35%;</a:t>
                       </a:r>
                     </a:p>
                     <a:p>
+                      <a:pPr algn="l"/>
                       <a:r>
                         <a:rPr lang="es-ES" sz="900" b="0" dirty="0"/>
                         <a:t>    text-align: center;</a:t>
                       </a:r>
                     </a:p>
                     <a:p>
+                      <a:pPr algn="l"/>
                       <a:r>
                         <a:rPr lang="es-ES" sz="900" b="0" dirty="0"/>
                         <a:t>}</a:t>
                       </a:r>
                     </a:p>
                     <a:p>
+                      <a:pPr algn="l"/>
+                      <a:endParaRPr lang="es-ES" sz="900" b="0" dirty="0"/>
+                    </a:p>
+                    <a:p>
+                      <a:pPr algn="l"/>
                       <a:r>
                         <a:rPr lang="es-ES" sz="900" b="0" dirty="0"/>
                         <a:t>.boton {</a:t>
                       </a:r>
                     </a:p>
                     <a:p>
+                      <a:pPr algn="l"/>
                       <a:r>
                         <a:rPr lang="es-ES" sz="900" b="0" dirty="0"/>
                         <a:t>    display: inline-block;</a:t>
                       </a:r>
                     </a:p>
                     <a:p>
+                      <a:pPr algn="l"/>
                       <a:r>
                         <a:rPr lang="es-ES" sz="900" b="0" dirty="0"/>
                         <a:t>    border: 1px solid black;</a:t>
                       </a:r>
                     </a:p>
                     <a:p>
+                      <a:pPr algn="l"/>
                       <a:r>
                         <a:rPr lang="es-ES" sz="900" b="0" dirty="0"/>
                         <a:t>    border-radius: 10px;</a:t>
                       </a:r>
                     </a:p>
                     <a:p>
+                      <a:pPr algn="l"/>
                       <a:r>
                         <a:rPr lang="es-ES" sz="900" b="0" dirty="0"/>
                         <a:t>    font-size: 30px;</a:t>
                       </a:r>
                     </a:p>
                     <a:p>
+                      <a:pPr algn="l"/>
                       <a:r>
                         <a:rPr lang="es-ES" sz="900" b="0" dirty="0"/>
                         <a:t>    text-align: center;</a:t>
                       </a:r>
                     </a:p>
                     <a:p>
+                      <a:pPr algn="l"/>
                       <a:r>
                         <a:rPr lang="es-ES" sz="900" b="0" dirty="0"/>
                         <a:t>    margin-top: 10px;</a:t>
                       </a:r>
                     </a:p>
                     <a:p>
+                      <a:pPr algn="l"/>
                       <a:r>
                         <a:rPr lang="es-ES" sz="900" b="0" dirty="0"/>
                         <a:t>    margin-left: 10px;</a:t>
                       </a:r>
                     </a:p>
                     <a:p>
+                      <a:pPr algn="l"/>
                       <a:r>
                         <a:rPr lang="es-ES" sz="900" b="0" dirty="0"/>
                         <a:t>    width: 30%;</a:t>
                       </a:r>
                     </a:p>
                     <a:p>
+                      <a:pPr algn="l"/>
                       <a:r>
                         <a:rPr lang="es-ES" sz="900" b="0" dirty="0"/>
                         <a:t>}</a:t>
@@ -7974,228 +8543,266 @@
                     <a:bodyPr/>
                     <a:lstStyle/>
                     <a:p>
+                      <a:pPr algn="l"/>
                       <a:r>
                         <a:rPr lang="es-ES" sz="1000" b="1" dirty="0"/>
                         <a:t>- JavaScript:</a:t>
                       </a:r>
                     </a:p>
                     <a:p>
+                      <a:pPr algn="l"/>
                       <a:r>
                         <a:rPr lang="es-ES" sz="900" b="0" dirty="0"/>
                         <a:t>function multriplicacion(){</a:t>
                       </a:r>
                     </a:p>
                     <a:p>
+                      <a:pPr algn="l"/>
                       <a:r>
                         <a:rPr lang="es-ES" sz="900" b="0" dirty="0"/>
                         <a:t>    var num = document.getElementById("num").value;</a:t>
                       </a:r>
                     </a:p>
                     <a:p>
+                      <a:pPr algn="l"/>
                       <a:r>
                         <a:rPr lang="es-ES" sz="900" b="0" dirty="0"/>
                         <a:t>    if (isNaN(num)) {alert("[ERROR] El valor introduciodo es un String.")}</a:t>
                       </a:r>
                     </a:p>
                     <a:p>
+                      <a:pPr algn="l"/>
                       <a:r>
                         <a:rPr lang="es-ES" sz="900" b="0" dirty="0"/>
                         <a:t>    else if (Number.isInteger(parseInt(num))) {</a:t>
                       </a:r>
                     </a:p>
                     <a:p>
+                      <a:pPr algn="l"/>
                       <a:r>
                         <a:rPr lang="es-ES" sz="900" b="0" dirty="0"/>
                         <a:t>        if (num.length &gt; 15) {</a:t>
                       </a:r>
                     </a:p>
                     <a:p>
+                      <a:pPr algn="l"/>
                       <a:r>
                         <a:rPr lang="es-ES" sz="900" b="0" dirty="0"/>
                         <a:t>            alert("[ERROR] El numero es demasiado largo (max 15 caracteres).");</a:t>
                       </a:r>
                     </a:p>
                     <a:p>
+                      <a:pPr algn="l"/>
                       <a:r>
                         <a:rPr lang="es-ES" sz="900" b="0" dirty="0"/>
                         <a:t>            document.getElementById("num").value = "";</a:t>
                       </a:r>
                     </a:p>
                     <a:p>
+                      <a:pPr algn="l"/>
                       <a:r>
                         <a:rPr lang="es-ES" sz="900" b="0" dirty="0"/>
                         <a:t>        }</a:t>
                       </a:r>
                     </a:p>
                     <a:p>
+                      <a:pPr algn="l"/>
                       <a:r>
                         <a:rPr lang="es-ES" sz="900" b="0" dirty="0"/>
                         <a:t>        else{</a:t>
                       </a:r>
                     </a:p>
                     <a:p>
+                      <a:pPr algn="l"/>
                       <a:r>
                         <a:rPr lang="es-ES" sz="900" b="0" dirty="0"/>
                         <a:t>            var tabla = document.getElementById("tabla");</a:t>
                       </a:r>
                     </a:p>
                     <a:p>
+                      <a:pPr algn="l"/>
                       <a:r>
                         <a:rPr lang="es-ES" sz="900" b="0" dirty="0"/>
                         <a:t>            tabla.innerHTML = "";</a:t>
                       </a:r>
                     </a:p>
                     <a:p>
+                      <a:pPr algn="l"/>
                       <a:r>
                         <a:rPr lang="es-ES" sz="900" b="0" dirty="0"/>
                         <a:t>            for (var i = 0; i &lt;= 10; i++) {</a:t>
                       </a:r>
                     </a:p>
                     <a:p>
+                      <a:pPr algn="l"/>
                       <a:r>
                         <a:rPr lang="es-ES" sz="900" b="0" dirty="0"/>
                         <a:t>                var div1 = document.createElement("div");</a:t>
                       </a:r>
                     </a:p>
                     <a:p>
+                      <a:pPr algn="l"/>
                       <a:r>
                         <a:rPr lang="es-ES" sz="900" b="0" dirty="0"/>
                         <a:t>                div1.innerHTML = i;</a:t>
                       </a:r>
                     </a:p>
                     <a:p>
+                      <a:pPr algn="l"/>
                       <a:r>
                         <a:rPr lang="es-ES" sz="900" b="0" dirty="0"/>
                         <a:t>                tabla.appendChild(div1);</a:t>
                       </a:r>
                     </a:p>
                     <a:p>
+                      <a:pPr algn="l"/>
                       <a:r>
                         <a:rPr lang="es-ES" sz="900" b="0" dirty="0"/>
                         <a:t>                var div2 = document.createElement("div");</a:t>
                       </a:r>
                     </a:p>
                     <a:p>
+                      <a:pPr algn="l"/>
                       <a:r>
                         <a:rPr lang="es-ES" sz="900" b="0" dirty="0"/>
                         <a:t>                div2.innerHTML = " x ";</a:t>
                       </a:r>
                     </a:p>
                     <a:p>
+                      <a:pPr algn="l"/>
                       <a:r>
                         <a:rPr lang="es-ES" sz="900" b="0" dirty="0"/>
                         <a:t>                tabla.appendChild(div2);</a:t>
                       </a:r>
                     </a:p>
                     <a:p>
+                      <a:pPr algn="l"/>
                       <a:r>
                         <a:rPr lang="es-ES" sz="900" b="0" dirty="0"/>
                         <a:t>                var div3 = document.createElement("div");</a:t>
                       </a:r>
                     </a:p>
                     <a:p>
+                      <a:pPr algn="l"/>
                       <a:r>
                         <a:rPr lang="es-ES" sz="900" b="0" dirty="0"/>
                         <a:t>                div3.innerHTML = num;</a:t>
                       </a:r>
                     </a:p>
                     <a:p>
+                      <a:pPr algn="l"/>
                       <a:r>
                         <a:rPr lang="es-ES" sz="900" b="0" dirty="0"/>
                         <a:t>                tabla.appendChild(div3);</a:t>
                       </a:r>
                     </a:p>
                     <a:p>
+                      <a:pPr algn="l"/>
                       <a:r>
                         <a:rPr lang="es-ES" sz="900" b="0" dirty="0"/>
                         <a:t>                var div4 = document.createElement("div");</a:t>
                       </a:r>
                     </a:p>
                     <a:p>
+                      <a:pPr algn="l"/>
                       <a:r>
                         <a:rPr lang="es-ES" sz="900" b="0" dirty="0"/>
                         <a:t>                div4.innerHTML = " = ";</a:t>
                       </a:r>
                     </a:p>
                     <a:p>
+                      <a:pPr algn="l"/>
                       <a:r>
                         <a:rPr lang="es-ES" sz="900" b="0" dirty="0"/>
                         <a:t>                tabla.appendChild(div4);</a:t>
                       </a:r>
                     </a:p>
                     <a:p>
+                      <a:pPr algn="l"/>
                       <a:r>
                         <a:rPr lang="es-ES" sz="900" b="0" dirty="0"/>
                         <a:t>                var div5 = document.createElement("div");</a:t>
                       </a:r>
                     </a:p>
                     <a:p>
+                      <a:pPr algn="l"/>
                       <a:r>
                         <a:rPr lang="es-ES" sz="900" b="0" dirty="0"/>
                         <a:t>                div5.innerHTML = (num*i);</a:t>
                       </a:r>
                     </a:p>
                     <a:p>
+                      <a:pPr algn="l"/>
                       <a:r>
                         <a:rPr lang="es-ES" sz="900" b="0" dirty="0"/>
                         <a:t>                tabla.appendChild(div5);</a:t>
                       </a:r>
                     </a:p>
                     <a:p>
+                      <a:pPr algn="l"/>
                       <a:r>
                         <a:rPr lang="es-ES" sz="900" b="0" dirty="0"/>
                         <a:t>            }</a:t>
                       </a:r>
                     </a:p>
                     <a:p>
+                      <a:pPr algn="l"/>
                       <a:r>
                         <a:rPr lang="es-ES" sz="900" b="0" dirty="0"/>
                         <a:t>        }</a:t>
                       </a:r>
                     </a:p>
                     <a:p>
+                      <a:pPr algn="l"/>
                       <a:r>
                         <a:rPr lang="es-ES" sz="900" b="0" dirty="0"/>
                         <a:t>    }</a:t>
                       </a:r>
                     </a:p>
                     <a:p>
+                      <a:pPr algn="l"/>
                       <a:r>
                         <a:rPr lang="es-ES" sz="900" b="0" dirty="0"/>
                         <a:t>    else {alert("[ERROR] No se introdujo ningún valor.")}</a:t>
                       </a:r>
                     </a:p>
                     <a:p>
+                      <a:pPr algn="l"/>
                       <a:r>
                         <a:rPr lang="es-ES" sz="900" b="0" dirty="0"/>
                         <a:t>}</a:t>
                       </a:r>
                     </a:p>
                     <a:p>
+                      <a:pPr algn="l"/>
                       <a:r>
                         <a:rPr lang="es-ES" sz="900" b="0" dirty="0"/>
                         <a:t>function reseteo(){</a:t>
                       </a:r>
                     </a:p>
                     <a:p>
+                      <a:pPr algn="l"/>
                       <a:r>
                         <a:rPr lang="es-ES" sz="900" b="0" dirty="0"/>
                         <a:t>    var tabla = document.getElementById("tabla");</a:t>
                       </a:r>
                     </a:p>
                     <a:p>
+                      <a:pPr algn="l"/>
                       <a:r>
                         <a:rPr lang="es-ES" sz="900" b="0" dirty="0"/>
                         <a:t>    tabla.innerHTML = "";</a:t>
                       </a:r>
                     </a:p>
                     <a:p>
+                      <a:pPr algn="l"/>
                       <a:r>
                         <a:rPr lang="es-ES" sz="900" b="0" dirty="0"/>
                         <a:t>    document.getElementById("num").value = "";</a:t>
                       </a:r>
                     </a:p>
                     <a:p>
+                      <a:pPr algn="l"/>
                       <a:r>
                         <a:rPr lang="es-ES" sz="900" b="0" dirty="0"/>
                         <a:t>}</a:t>

</xml_diff>